<commit_message>
Finally make login progress.
</commit_message>
<xml_diff>
--- a/tosca-account-demo.pptx
+++ b/tosca-account-demo.pptx
@@ -1281,7 +1281,7 @@
           <p:nvPr userDrawn="1"/>
         </p:nvPicPr>
         <mc:AlternateContent xmlns:mc="http://schemas.openxmlformats.org/markup-compatibility/2006">
-          <mc:Choice xmlns="" xmlns:mv="urn:schemas-microsoft-com:mac:vml" xmlns:ma="http://schemas.microsoft.com/office/mac/drawingml/2008/main" Requires="ma">
+          <mc:Choice xmlns:ma="http://schemas.microsoft.com/office/mac/drawingml/2008/main" xmlns:mv="urn:schemas-microsoft-com:mac:vml" xmlns="" Requires="ma">
             <p:blipFill>
               <a:blip r:embed="rId3"/>
               <a:stretch>
@@ -1428,7 +1428,35 @@
                 <a:ea typeface="Open Sans" pitchFamily="34" charset="0"/>
                 <a:cs typeface="Open Sans" pitchFamily="34" charset="0"/>
               </a:rPr>
-              <a:t>© 2014 Tricentis GmbH. All rights reserved.</a:t>
+              <a:t>© </a:t>
+            </a:r>
+            <a:r>
+              <a:rPr lang="en-US" sz="800" dirty="0" smtClean="0">
+                <a:solidFill>
+                  <a:schemeClr val="tx1">
+                    <a:lumMod val="60000"/>
+                    <a:lumOff val="40000"/>
+                  </a:schemeClr>
+                </a:solidFill>
+                <a:latin typeface="Open Sans" pitchFamily="34" charset="0"/>
+                <a:ea typeface="Open Sans" pitchFamily="34" charset="0"/>
+                <a:cs typeface="Open Sans" pitchFamily="34" charset="0"/>
+              </a:rPr>
+              <a:t>2015 </a:t>
+            </a:r>
+            <a:r>
+              <a:rPr lang="en-US" sz="800" dirty="0" smtClean="0">
+                <a:solidFill>
+                  <a:schemeClr val="tx1">
+                    <a:lumMod val="60000"/>
+                    <a:lumOff val="40000"/>
+                  </a:schemeClr>
+                </a:solidFill>
+                <a:latin typeface="Open Sans" pitchFamily="34" charset="0"/>
+                <a:ea typeface="Open Sans" pitchFamily="34" charset="0"/>
+                <a:cs typeface="Open Sans" pitchFamily="34" charset="0"/>
+              </a:rPr>
+              <a:t>Tricentis GmbH. All rights reserved.</a:t>
             </a:r>
             <a:endParaRPr lang="en-US" sz="800" dirty="0">
               <a:solidFill>
@@ -7062,7 +7090,7 @@
           <p:nvPr userDrawn="1"/>
         </p:nvPicPr>
         <mc:AlternateContent xmlns:mc="http://schemas.openxmlformats.org/markup-compatibility/2006">
-          <mc:Choice xmlns="" xmlns:mv="urn:schemas-microsoft-com:mac:vml" xmlns:ma="http://schemas.microsoft.com/office/mac/drawingml/2008/main" Requires="ma">
+          <mc:Choice xmlns:ma="http://schemas.microsoft.com/office/mac/drawingml/2008/main" xmlns:mv="urn:schemas-microsoft-com:mac:vml" xmlns="" Requires="ma">
             <p:blipFill>
               <a:blip r:embed="rId3"/>
               <a:stretch>
@@ -8760,7 +8788,7 @@
           <p:nvPr userDrawn="1"/>
         </p:nvPicPr>
         <mc:AlternateContent xmlns:mc="http://schemas.openxmlformats.org/markup-compatibility/2006">
-          <mc:Choice xmlns="" xmlns:mv="urn:schemas-microsoft-com:mac:vml" xmlns:ma="http://schemas.microsoft.com/office/mac/drawingml/2008/main" Requires="ma">
+          <mc:Choice xmlns:ma="http://schemas.microsoft.com/office/mac/drawingml/2008/main" xmlns:mv="urn:schemas-microsoft-com:mac:vml" xmlns="" Requires="ma">
             <p:blipFill>
               <a:blip r:embed="rId3"/>
               <a:stretch>
@@ -8992,7 +9020,7 @@
           <p:nvPr userDrawn="1"/>
         </p:nvPicPr>
         <mc:AlternateContent xmlns:mc="http://schemas.openxmlformats.org/markup-compatibility/2006">
-          <mc:Choice xmlns="" xmlns:mv="urn:schemas-microsoft-com:mac:vml" xmlns:ma="http://schemas.microsoft.com/office/mac/drawingml/2008/main" Requires="ma">
+          <mc:Choice xmlns:ma="http://schemas.microsoft.com/office/mac/drawingml/2008/main" xmlns:mv="urn:schemas-microsoft-com:mac:vml" xmlns="" Requires="ma">
             <p:blipFill>
               <a:blip r:embed="rId3"/>
               <a:stretch>
@@ -9447,7 +9475,7 @@
           <p:nvPr userDrawn="1"/>
         </p:nvPicPr>
         <mc:AlternateContent xmlns:mc="http://schemas.openxmlformats.org/markup-compatibility/2006">
-          <mc:Choice xmlns="" xmlns:mv="urn:schemas-microsoft-com:mac:vml" xmlns:ma="http://schemas.microsoft.com/office/mac/drawingml/2008/main" Requires="ma">
+          <mc:Choice xmlns:ma="http://schemas.microsoft.com/office/mac/drawingml/2008/main" xmlns:mv="urn:schemas-microsoft-com:mac:vml" xmlns="" Requires="ma">
             <p:blipFill>
               <a:blip r:embed="rId3"/>
               <a:stretch>
@@ -9908,7 +9936,7 @@
           <p:nvPr userDrawn="1"/>
         </p:nvPicPr>
         <mc:AlternateContent xmlns:mc="http://schemas.openxmlformats.org/markup-compatibility/2006">
-          <mc:Choice xmlns="" xmlns:mv="urn:schemas-microsoft-com:mac:vml" xmlns:ma="http://schemas.microsoft.com/office/mac/drawingml/2008/main" Requires="ma">
+          <mc:Choice xmlns:ma="http://schemas.microsoft.com/office/mac/drawingml/2008/main" xmlns:mv="urn:schemas-microsoft-com:mac:vml" xmlns="" Requires="ma">
             <p:blipFill>
               <a:blip r:embed="rId3"/>
               <a:stretch>
@@ -11216,7 +11244,7 @@
           <p:nvPr/>
         </p:nvPicPr>
         <mc:AlternateContent xmlns:mc="http://schemas.openxmlformats.org/markup-compatibility/2006">
-          <mc:Choice xmlns="" xmlns:mv="urn:schemas-microsoft-com:mac:vml" xmlns:ma="http://schemas.microsoft.com/office/mac/drawingml/2008/main" Requires="ma">
+          <mc:Choice xmlns:ma="http://schemas.microsoft.com/office/mac/drawingml/2008/main" xmlns:mv="urn:schemas-microsoft-com:mac:vml" xmlns="" Requires="ma">
             <p:blipFill>
               <a:blip r:embed="rId44"/>
               <a:stretch>
@@ -11805,7 +11833,7 @@
           <a:p>
             <a:r>
               <a:rPr lang="en-GB" dirty="0" smtClean="0"/>
-              <a:t>Things are stored locally</a:t>
+              <a:t>Problem</a:t>
             </a:r>
             <a:endParaRPr lang="en-GB" dirty="0"/>
           </a:p>
@@ -11952,13 +11980,6 @@
                 </a:rPr>
                 <a:t>WS 1</a:t>
               </a:r>
-              <a:endParaRPr lang="de-AT" sz="2000" dirty="0" smtClean="0">
-                <a:solidFill>
-                  <a:schemeClr val="bg1"/>
-                </a:solidFill>
-                <a:latin typeface="Open Sans"/>
-                <a:cs typeface="Open Sans"/>
-              </a:endParaRPr>
             </a:p>
           </p:txBody>
         </p:sp>
@@ -12104,13 +12125,6 @@
                 </a:rPr>
                 <a:t>WS 2</a:t>
               </a:r>
-              <a:endParaRPr lang="de-AT" sz="2000" dirty="0" smtClean="0">
-                <a:solidFill>
-                  <a:schemeClr val="bg1"/>
-                </a:solidFill>
-                <a:latin typeface="Open Sans"/>
-                <a:cs typeface="Open Sans"/>
-              </a:endParaRPr>
             </a:p>
           </p:txBody>
         </p:sp>
@@ -12221,25 +12235,8 @@
                   <a:latin typeface="Open Sans"/>
                   <a:cs typeface="Open Sans"/>
                 </a:rPr>
-                <a:t>Use</a:t>
+                <a:t>User Settings</a:t>
               </a:r>
-              <a:r>
-                <a:rPr lang="de-AT" sz="2000" dirty="0" smtClean="0">
-                  <a:solidFill>
-                    <a:schemeClr val="tx2"/>
-                  </a:solidFill>
-                  <a:latin typeface="Open Sans"/>
-                  <a:cs typeface="Open Sans"/>
-                </a:rPr>
-                <a:t>r Settings</a:t>
-              </a:r>
-              <a:endParaRPr lang="de-AT" sz="2000" dirty="0" smtClean="0">
-                <a:solidFill>
-                  <a:schemeClr val="tx2"/>
-                </a:solidFill>
-                <a:latin typeface="Open Sans"/>
-                <a:cs typeface="Open Sans"/>
-              </a:endParaRPr>
             </a:p>
           </p:txBody>
         </p:sp>
@@ -12405,13 +12402,6 @@
                 </a:rPr>
                 <a:t> Utilities</a:t>
               </a:r>
-              <a:endParaRPr lang="de-AT" sz="2000" dirty="0" smtClean="0">
-                <a:solidFill>
-                  <a:schemeClr val="tx2"/>
-                </a:solidFill>
-                <a:latin typeface="Open Sans"/>
-                <a:cs typeface="Open Sans"/>
-              </a:endParaRPr>
             </a:p>
           </p:txBody>
         </p:sp>
@@ -12697,7 +12687,7 @@
           <a:p>
             <a:r>
               <a:rPr lang="en-GB" dirty="0" smtClean="0"/>
-              <a:t>Keep users in sync</a:t>
+              <a:t>Solution</a:t>
             </a:r>
             <a:endParaRPr lang="en-GB" dirty="0"/>
           </a:p>
@@ -12795,10 +12785,6 @@
                 </a:rPr>
                 <a:t> 1</a:t>
               </a:r>
-              <a:endParaRPr lang="de-AT" sz="2000" dirty="0" smtClean="0">
-                <a:latin typeface="Open Sans"/>
-                <a:cs typeface="Open Sans"/>
-              </a:endParaRPr>
             </a:p>
           </p:txBody>
         </p:sp>
@@ -12895,10 +12881,6 @@
                 </a:rPr>
                 <a:t> 2</a:t>
               </a:r>
-              <a:endParaRPr lang="de-AT" sz="2000" dirty="0" smtClean="0">
-                <a:latin typeface="Open Sans"/>
-                <a:cs typeface="Open Sans"/>
-              </a:endParaRPr>
             </a:p>
           </p:txBody>
         </p:sp>
@@ -12995,10 +12977,6 @@
                 </a:rPr>
                 <a:t> 3</a:t>
               </a:r>
-              <a:endParaRPr lang="de-AT" sz="2000" dirty="0" smtClean="0">
-                <a:latin typeface="Open Sans"/>
-                <a:cs typeface="Open Sans"/>
-              </a:endParaRPr>
             </a:p>
           </p:txBody>
         </p:sp>
@@ -13032,10 +13010,6 @@
               </a:rPr>
               <a:t>Tosca Account Server</a:t>
             </a:r>
-            <a:endParaRPr lang="en-GB" sz="2800" dirty="0" smtClean="0">
-              <a:latin typeface="Open Sans"/>
-              <a:cs typeface="Open Sans"/>
-            </a:endParaRPr>
           </a:p>
         </p:txBody>
       </p:sp>
@@ -13160,11 +13134,11 @@
   <p:clrMapOvr>
     <a:masterClrMapping/>
   </p:clrMapOvr>
-  <mc:AlternateContent xmlns:mc="http://schemas.openxmlformats.org/markup-compatibility/2006">
-    <mc:Choice xmlns:p14="http://schemas.microsoft.com/office/powerpoint/2010/main" Requires="p14">
+  <mc:AlternateContent xmlns:mc="http://schemas.openxmlformats.org/markup-compatibility/2006" xmlns:p14="http://schemas.microsoft.com/office/powerpoint/2010/main">
+    <mc:Choice Requires="p14">
       <p:transition spd="slow" p14:dur="2000"/>
     </mc:Choice>
-    <mc:Fallback>
+    <mc:Fallback xmlns="">
       <p:transition spd="slow"/>
     </mc:Fallback>
   </mc:AlternateContent>
@@ -13227,13 +13201,6 @@
               </a:rPr>
               <a:t>Demo</a:t>
             </a:r>
-            <a:endParaRPr lang="en-GB" sz="7200" dirty="0" smtClean="0">
-              <a:solidFill>
-                <a:schemeClr val="tx2"/>
-              </a:solidFill>
-              <a:latin typeface="Open Sans"/>
-              <a:cs typeface="Open Sans"/>
-            </a:endParaRPr>
           </a:p>
         </p:txBody>
       </p:sp>
@@ -13247,11 +13214,11 @@
   <p:clrMapOvr>
     <a:masterClrMapping/>
   </p:clrMapOvr>
-  <mc:AlternateContent xmlns:mc="http://schemas.openxmlformats.org/markup-compatibility/2006">
-    <mc:Choice xmlns:p14="http://schemas.microsoft.com/office/powerpoint/2010/main" Requires="p14">
+  <mc:AlternateContent xmlns:mc="http://schemas.openxmlformats.org/markup-compatibility/2006" xmlns:p14="http://schemas.microsoft.com/office/powerpoint/2010/main">
+    <mc:Choice Requires="p14">
       <p:transition spd="slow" p14:dur="2000"/>
     </mc:Choice>
-    <mc:Fallback>
+    <mc:Fallback xmlns="">
       <p:transition spd="slow"/>
     </mc:Fallback>
   </mc:AlternateContent>

</xml_diff>